<commit_message>
Fix typo about creating CL image from GL *buffer*, fixed to say CL buffer
</commit_message>
<xml_diff>
--- a/advanced_part4.pptx
+++ b/advanced_part4.pptx
@@ -224,7 +224,7 @@
           <a:p>
             <a:fld id="{2E256997-BFE9-1645-ACA2-FB0069B34735}" type="datetimeFigureOut">
               <a:rPr lang="en-US" smtClean="0"/>
-              <a:t>11/25/18</a:t>
+              <a:t>5/9/19</a:t>
             </a:fld>
             <a:endParaRPr lang="en-GB"/>
           </a:p>
@@ -1417,7 +1417,7 @@
           <a:p>
             <a:fld id="{80303638-A28B-D847-B11E-FC7BFED9E47E}" type="datetime1">
               <a:rPr lang="en-GB" smtClean="0"/>
-              <a:t>25/11/2018</a:t>
+              <a:t>09/05/2019</a:t>
             </a:fld>
             <a:endParaRPr lang="en-GB"/>
           </a:p>
@@ -1585,7 +1585,7 @@
           <a:p>
             <a:fld id="{EE809228-39DA-B64F-8AF2-27C76A91CB87}" type="datetime1">
               <a:rPr lang="en-GB" smtClean="0"/>
-              <a:t>25/11/2018</a:t>
+              <a:t>09/05/2019</a:t>
             </a:fld>
             <a:endParaRPr lang="en-GB"/>
           </a:p>
@@ -1763,7 +1763,7 @@
           <a:p>
             <a:fld id="{81D47792-966E-E54F-8F9B-97A473AB3CA3}" type="datetime1">
               <a:rPr lang="en-GB" smtClean="0"/>
-              <a:t>25/11/2018</a:t>
+              <a:t>09/05/2019</a:t>
             </a:fld>
             <a:endParaRPr lang="en-GB"/>
           </a:p>
@@ -1931,7 +1931,7 @@
           <a:p>
             <a:fld id="{7DFCAB7C-8C9E-454D-BDDF-463FD05F41E5}" type="datetime1">
               <a:rPr lang="en-GB" smtClean="0"/>
-              <a:t>25/11/2018</a:t>
+              <a:t>09/05/2019</a:t>
             </a:fld>
             <a:endParaRPr lang="en-GB"/>
           </a:p>
@@ -2176,7 +2176,7 @@
           <a:p>
             <a:fld id="{FBC9F268-6EE1-304E-8D73-BAC26B47A8B3}" type="datetime1">
               <a:rPr lang="en-GB" smtClean="0"/>
-              <a:t>25/11/2018</a:t>
+              <a:t>09/05/2019</a:t>
             </a:fld>
             <a:endParaRPr lang="en-GB"/>
           </a:p>
@@ -2461,7 +2461,7 @@
           <a:p>
             <a:fld id="{98E407AC-62DB-AE4B-8A92-17BD9895FF10}" type="datetime1">
               <a:rPr lang="en-GB" smtClean="0"/>
-              <a:t>25/11/2018</a:t>
+              <a:t>09/05/2019</a:t>
             </a:fld>
             <a:endParaRPr lang="en-GB"/>
           </a:p>
@@ -2880,7 +2880,7 @@
           <a:p>
             <a:fld id="{186F4743-FA6B-904F-9382-7C61A3B08840}" type="datetime1">
               <a:rPr lang="en-GB" smtClean="0"/>
-              <a:t>25/11/2018</a:t>
+              <a:t>09/05/2019</a:t>
             </a:fld>
             <a:endParaRPr lang="en-GB"/>
           </a:p>
@@ -2997,7 +2997,7 @@
           <a:p>
             <a:fld id="{1A6C0D44-9D44-A440-8538-A0C8A3D806DE}" type="datetime1">
               <a:rPr lang="en-GB" smtClean="0"/>
-              <a:t>25/11/2018</a:t>
+              <a:t>09/05/2019</a:t>
             </a:fld>
             <a:endParaRPr lang="en-GB"/>
           </a:p>
@@ -3092,7 +3092,7 @@
           <a:p>
             <a:fld id="{4B354FC5-635D-134F-9969-D3153C3E0F8C}" type="datetime1">
               <a:rPr lang="en-GB" smtClean="0"/>
-              <a:t>25/11/2018</a:t>
+              <a:t>09/05/2019</a:t>
             </a:fld>
             <a:endParaRPr lang="en-GB"/>
           </a:p>
@@ -3367,7 +3367,7 @@
           <a:p>
             <a:fld id="{94A1681F-05A7-BF42-8217-B06A7985FE3E}" type="datetime1">
               <a:rPr lang="en-GB" smtClean="0"/>
-              <a:t>25/11/2018</a:t>
+              <a:t>09/05/2019</a:t>
             </a:fld>
             <a:endParaRPr lang="en-GB"/>
           </a:p>
@@ -3619,7 +3619,7 @@
           <a:p>
             <a:fld id="{367A10F4-4878-754D-BF86-3E95C5C37EBE}" type="datetime1">
               <a:rPr lang="en-GB" smtClean="0"/>
-              <a:t>25/11/2018</a:t>
+              <a:t>09/05/2019</a:t>
             </a:fld>
             <a:endParaRPr lang="en-GB"/>
           </a:p>
@@ -3830,7 +3830,7 @@
           <a:p>
             <a:fld id="{79969E55-E003-AB40-9008-2507B839AC43}" type="datetime1">
               <a:rPr lang="en-GB" smtClean="0"/>
-              <a:t>25/11/2018</a:t>
+              <a:t>09/05/2019</a:t>
             </a:fld>
             <a:endParaRPr lang="en-GB"/>
           </a:p>
@@ -4752,7 +4752,7 @@
                 <a:latin typeface="Courier New"/>
                 <a:cs typeface="Courier New"/>
               </a:rPr>
-              <a:t>// Create an OpenCL image from an OpenGL buffer</a:t>
+              <a:t>// Create an OpenCL buffer from an OpenGL buffer</a:t>
             </a:r>
           </a:p>
           <a:p>
@@ -5598,7 +5598,7 @@
                 <a:latin typeface="Courier New"/>
                 <a:cs typeface="Courier New"/>
               </a:rPr>
-              <a:t>// Create an OpenCL image from an OpenGL buffer</a:t>
+              <a:t>// Create an OpenCL buffer from an OpenGL buffer</a:t>
             </a:r>
           </a:p>
           <a:p>

</xml_diff>